<commit_message>
Error correction, validation change, responsiveness
</commit_message>
<xml_diff>
--- a/media/לוגו.pptx
+++ b/media/לוגו.pptx
@@ -259,7 +259,7 @@
           <a:p>
             <a:fld id="{1CF9F060-F4DB-4F06-B3DF-FCFE7F8EEAC1}" type="datetimeFigureOut">
               <a:rPr lang="he-IL" smtClean="0"/>
-              <a:t>ה'/חשון/תשפ"ה</a:t>
+              <a:t>ז'/חשון/תשפ"ה</a:t>
             </a:fld>
             <a:endParaRPr lang="he-IL"/>
           </a:p>
@@ -457,7 +457,7 @@
           <a:p>
             <a:fld id="{1CF9F060-F4DB-4F06-B3DF-FCFE7F8EEAC1}" type="datetimeFigureOut">
               <a:rPr lang="he-IL" smtClean="0"/>
-              <a:t>ה'/חשון/תשפ"ה</a:t>
+              <a:t>ז'/חשון/תשפ"ה</a:t>
             </a:fld>
             <a:endParaRPr lang="he-IL"/>
           </a:p>
@@ -665,7 +665,7 @@
           <a:p>
             <a:fld id="{1CF9F060-F4DB-4F06-B3DF-FCFE7F8EEAC1}" type="datetimeFigureOut">
               <a:rPr lang="he-IL" smtClean="0"/>
-              <a:t>ה'/חשון/תשפ"ה</a:t>
+              <a:t>ז'/חשון/תשפ"ה</a:t>
             </a:fld>
             <a:endParaRPr lang="he-IL"/>
           </a:p>
@@ -863,7 +863,7 @@
           <a:p>
             <a:fld id="{1CF9F060-F4DB-4F06-B3DF-FCFE7F8EEAC1}" type="datetimeFigureOut">
               <a:rPr lang="he-IL" smtClean="0"/>
-              <a:t>ה'/חשון/תשפ"ה</a:t>
+              <a:t>ז'/חשון/תשפ"ה</a:t>
             </a:fld>
             <a:endParaRPr lang="he-IL"/>
           </a:p>
@@ -1138,7 +1138,7 @@
           <a:p>
             <a:fld id="{1CF9F060-F4DB-4F06-B3DF-FCFE7F8EEAC1}" type="datetimeFigureOut">
               <a:rPr lang="he-IL" smtClean="0"/>
-              <a:t>ה'/חשון/תשפ"ה</a:t>
+              <a:t>ז'/חשון/תשפ"ה</a:t>
             </a:fld>
             <a:endParaRPr lang="he-IL"/>
           </a:p>
@@ -1403,7 +1403,7 @@
           <a:p>
             <a:fld id="{1CF9F060-F4DB-4F06-B3DF-FCFE7F8EEAC1}" type="datetimeFigureOut">
               <a:rPr lang="he-IL" smtClean="0"/>
-              <a:t>ה'/חשון/תשפ"ה</a:t>
+              <a:t>ז'/חשון/תשפ"ה</a:t>
             </a:fld>
             <a:endParaRPr lang="he-IL"/>
           </a:p>
@@ -1815,7 +1815,7 @@
           <a:p>
             <a:fld id="{1CF9F060-F4DB-4F06-B3DF-FCFE7F8EEAC1}" type="datetimeFigureOut">
               <a:rPr lang="he-IL" smtClean="0"/>
-              <a:t>ה'/חשון/תשפ"ה</a:t>
+              <a:t>ז'/חשון/תשפ"ה</a:t>
             </a:fld>
             <a:endParaRPr lang="he-IL"/>
           </a:p>
@@ -1956,7 +1956,7 @@
           <a:p>
             <a:fld id="{1CF9F060-F4DB-4F06-B3DF-FCFE7F8EEAC1}" type="datetimeFigureOut">
               <a:rPr lang="he-IL" smtClean="0"/>
-              <a:t>ה'/חשון/תשפ"ה</a:t>
+              <a:t>ז'/חשון/תשפ"ה</a:t>
             </a:fld>
             <a:endParaRPr lang="he-IL"/>
           </a:p>
@@ -2069,7 +2069,7 @@
           <a:p>
             <a:fld id="{1CF9F060-F4DB-4F06-B3DF-FCFE7F8EEAC1}" type="datetimeFigureOut">
               <a:rPr lang="he-IL" smtClean="0"/>
-              <a:t>ה'/חשון/תשפ"ה</a:t>
+              <a:t>ז'/חשון/תשפ"ה</a:t>
             </a:fld>
             <a:endParaRPr lang="he-IL"/>
           </a:p>
@@ -2380,7 +2380,7 @@
           <a:p>
             <a:fld id="{1CF9F060-F4DB-4F06-B3DF-FCFE7F8EEAC1}" type="datetimeFigureOut">
               <a:rPr lang="he-IL" smtClean="0"/>
-              <a:t>ה'/חשון/תשפ"ה</a:t>
+              <a:t>ז'/חשון/תשפ"ה</a:t>
             </a:fld>
             <a:endParaRPr lang="he-IL"/>
           </a:p>
@@ -2668,7 +2668,7 @@
           <a:p>
             <a:fld id="{1CF9F060-F4DB-4F06-B3DF-FCFE7F8EEAC1}" type="datetimeFigureOut">
               <a:rPr lang="he-IL" smtClean="0"/>
-              <a:t>ה'/חשון/תשפ"ה</a:t>
+              <a:t>ז'/חשון/תשפ"ה</a:t>
             </a:fld>
             <a:endParaRPr lang="he-IL"/>
           </a:p>
@@ -2909,7 +2909,7 @@
           <a:p>
             <a:fld id="{1CF9F060-F4DB-4F06-B3DF-FCFE7F8EEAC1}" type="datetimeFigureOut">
               <a:rPr lang="he-IL" smtClean="0"/>
-              <a:t>ה'/חשון/תשפ"ה</a:t>
+              <a:t>ז'/חשון/תשפ"ה</a:t>
             </a:fld>
             <a:endParaRPr lang="he-IL"/>
           </a:p>
@@ -3328,10 +3328,154 @@
       </p:grpSpPr>
       <p:pic>
         <p:nvPicPr>
+          <p:cNvPr id="6" name="תמונה 5">
+            <a:extLst>
+              <a:ext uri="{FF2B5EF4-FFF2-40B4-BE49-F238E27FC236}">
+                <a16:creationId xmlns:a16="http://schemas.microsoft.com/office/drawing/2014/main" id="{21F3B97E-AE89-6B2B-428F-8F41B442F5D5}"/>
+              </a:ext>
+            </a:extLst>
+          </p:cNvPr>
+          <p:cNvPicPr>
+            <a:picLocks noChangeAspect="1"/>
+          </p:cNvPicPr>
+          <p:nvPr/>
+        </p:nvPicPr>
+        <p:blipFill>
+          <a:blip r:embed="rId2"/>
+          <a:srcRect l="32617" t="14503" r="14352" b="7001"/>
+          <a:stretch/>
+        </p:blipFill>
+        <p:spPr>
+          <a:xfrm>
+            <a:off x="5006899" y="2105561"/>
+            <a:ext cx="1414153" cy="1323439"/>
+          </a:xfrm>
+          <a:prstGeom prst="rect">
+            <a:avLst/>
+          </a:prstGeom>
+        </p:spPr>
+      </p:pic>
+      <p:pic>
+        <p:nvPicPr>
           <p:cNvPr id="13" name="תמונה 12" descr="תמונה שמכילה אומנות קליפיפם, גרפיקה, סמל, עיצוב גרפי&#10;&#10;התיאור נוצר באופן אוטומטי">
             <a:extLst>
               <a:ext uri="{FF2B5EF4-FFF2-40B4-BE49-F238E27FC236}">
                 <a16:creationId xmlns:a16="http://schemas.microsoft.com/office/drawing/2014/main" id="{B5B5B6E7-4EA5-DE83-103D-46A4D530C2C2}"/>
+              </a:ext>
+            </a:extLst>
+          </p:cNvPr>
+          <p:cNvPicPr>
+            <a:picLocks noChangeAspect="1"/>
+          </p:cNvPicPr>
+          <p:nvPr/>
+        </p:nvPicPr>
+        <p:blipFill>
+          <a:blip r:embed="rId3">
+            <a:extLst>
+              <a:ext uri="{28A0092B-C50C-407E-A947-70E740481C1C}">
+                <a14:useLocalDpi xmlns:a14="http://schemas.microsoft.com/office/drawing/2010/main" val="0"/>
+              </a:ext>
+            </a:extLst>
+          </a:blip>
+          <a:srcRect l="31568" t="19069" r="15664" b="6003"/>
+          <a:stretch/>
+        </p:blipFill>
+        <p:spPr>
+          <a:xfrm>
+            <a:off x="10092487" y="5015933"/>
+            <a:ext cx="1286721" cy="1155172"/>
+          </a:xfrm>
+          <a:prstGeom prst="rect">
+            <a:avLst/>
+          </a:prstGeom>
+        </p:spPr>
+      </p:pic>
+      <p:sp>
+        <p:nvSpPr>
+          <p:cNvPr id="14" name="תיבת טקסט 13">
+            <a:extLst>
+              <a:ext uri="{FF2B5EF4-FFF2-40B4-BE49-F238E27FC236}">
+                <a16:creationId xmlns:a16="http://schemas.microsoft.com/office/drawing/2014/main" id="{75F9B311-B20A-728B-3B13-876A93ECF6F7}"/>
+              </a:ext>
+            </a:extLst>
+          </p:cNvPr>
+          <p:cNvSpPr txBox="1"/>
+          <p:nvPr/>
+        </p:nvSpPr>
+        <p:spPr>
+          <a:xfrm>
+            <a:off x="7763439" y="4847666"/>
+            <a:ext cx="2589498" cy="1323439"/>
+          </a:xfrm>
+          <a:prstGeom prst="rect">
+            <a:avLst/>
+          </a:prstGeom>
+          <a:noFill/>
+        </p:spPr>
+        <p:txBody>
+          <a:bodyPr wrap="square" rtlCol="1">
+            <a:spAutoFit/>
+          </a:bodyPr>
+          <a:lstStyle/>
+          <a:p>
+            <a:r>
+              <a:rPr lang="en-US" sz="8000" b="1" dirty="0">
+                <a:latin typeface="SHELMAN" panose="00000400000000000000" pitchFamily="2" charset="2"/>
+              </a:rPr>
+              <a:t>My-Trip</a:t>
+            </a:r>
+            <a:endParaRPr lang="he-IL" sz="8000" b="1" dirty="0">
+              <a:latin typeface="SHELMAN" panose="00000400000000000000" pitchFamily="2" charset="2"/>
+            </a:endParaRPr>
+          </a:p>
+        </p:txBody>
+      </p:sp>
+      <p:sp>
+        <p:nvSpPr>
+          <p:cNvPr id="4" name="תיבת טקסט 3">
+            <a:extLst>
+              <a:ext uri="{FF2B5EF4-FFF2-40B4-BE49-F238E27FC236}">
+                <a16:creationId xmlns:a16="http://schemas.microsoft.com/office/drawing/2014/main" id="{54BCA1E1-7C1C-0A27-FDE1-FB11D071CC48}"/>
+              </a:ext>
+            </a:extLst>
+          </p:cNvPr>
+          <p:cNvSpPr txBox="1"/>
+          <p:nvPr/>
+        </p:nvSpPr>
+        <p:spPr>
+          <a:xfrm>
+            <a:off x="2544260" y="2097431"/>
+            <a:ext cx="2748296" cy="1323439"/>
+          </a:xfrm>
+          <a:prstGeom prst="rect">
+            <a:avLst/>
+          </a:prstGeom>
+          <a:noFill/>
+        </p:spPr>
+        <p:txBody>
+          <a:bodyPr wrap="square" rtlCol="1">
+            <a:spAutoFit/>
+          </a:bodyPr>
+          <a:lstStyle/>
+          <a:p>
+            <a:r>
+              <a:rPr lang="en-US" sz="8000" b="1" dirty="0">
+                <a:latin typeface="SHELMAN" panose="00000400000000000000" pitchFamily="2" charset="2"/>
+              </a:rPr>
+              <a:t>My-Trip</a:t>
+            </a:r>
+            <a:endParaRPr lang="he-IL" sz="8000" b="1" dirty="0">
+              <a:latin typeface="SHELMAN" panose="00000400000000000000" pitchFamily="2" charset="2"/>
+            </a:endParaRPr>
+          </a:p>
+        </p:txBody>
+      </p:sp>
+      <p:pic>
+        <p:nvPicPr>
+          <p:cNvPr id="7" name="תמונה 6">
+            <a:extLst>
+              <a:ext uri="{FF2B5EF4-FFF2-40B4-BE49-F238E27FC236}">
+                <a16:creationId xmlns:a16="http://schemas.microsoft.com/office/drawing/2014/main" id="{8FAAA8C1-F23E-0C2A-7FC3-2C6C932EDD56}"/>
               </a:ext>
             </a:extLst>
           </p:cNvPr>
@@ -3342,65 +3486,30 @@
         </p:nvPicPr>
         <p:blipFill>
           <a:blip r:embed="rId2">
-            <a:extLst>
-              <a:ext uri="{28A0092B-C50C-407E-A947-70E740481C1C}">
-                <a14:useLocalDpi xmlns:a14="http://schemas.microsoft.com/office/drawing/2010/main" val="0"/>
-              </a:ext>
-            </a:extLst>
+            <a:clrChange>
+              <a:clrFrom>
+                <a:srgbClr val="FFFFFF"/>
+              </a:clrFrom>
+              <a:clrTo>
+                <a:srgbClr val="FFFFFF">
+                  <a:alpha val="0"/>
+                </a:srgbClr>
+              </a:clrTo>
+            </a:clrChange>
           </a:blip>
-          <a:srcRect l="31568" t="19069" r="15664" b="6003"/>
+          <a:srcRect l="32617" t="14503" r="14352" b="7001"/>
           <a:stretch/>
         </p:blipFill>
         <p:spPr>
           <a:xfrm>
-            <a:off x="6487886" y="3097923"/>
-            <a:ext cx="1286721" cy="1155172"/>
+            <a:off x="8504665" y="1176292"/>
+            <a:ext cx="1929655" cy="1805873"/>
           </a:xfrm>
           <a:prstGeom prst="rect">
             <a:avLst/>
           </a:prstGeom>
         </p:spPr>
       </p:pic>
-      <p:sp>
-        <p:nvSpPr>
-          <p:cNvPr id="14" name="תיבת טקסט 13">
-            <a:extLst>
-              <a:ext uri="{FF2B5EF4-FFF2-40B4-BE49-F238E27FC236}">
-                <a16:creationId xmlns:a16="http://schemas.microsoft.com/office/drawing/2014/main" id="{75F9B311-B20A-728B-3B13-876A93ECF6F7}"/>
-              </a:ext>
-            </a:extLst>
-          </p:cNvPr>
-          <p:cNvSpPr txBox="1"/>
-          <p:nvPr/>
-        </p:nvSpPr>
-        <p:spPr>
-          <a:xfrm>
-            <a:off x="4139293" y="2929656"/>
-            <a:ext cx="2589498" cy="1323439"/>
-          </a:xfrm>
-          <a:prstGeom prst="rect">
-            <a:avLst/>
-          </a:prstGeom>
-          <a:noFill/>
-        </p:spPr>
-        <p:txBody>
-          <a:bodyPr wrap="square" rtlCol="1">
-            <a:spAutoFit/>
-          </a:bodyPr>
-          <a:lstStyle/>
-          <a:p>
-            <a:r>
-              <a:rPr lang="en-US" sz="8000" b="1" dirty="0">
-                <a:latin typeface="SHELMAN" panose="00000400000000000000" pitchFamily="2" charset="2"/>
-              </a:rPr>
-              <a:t>My-Trip</a:t>
-            </a:r>
-            <a:endParaRPr lang="he-IL" sz="8000" b="1" dirty="0">
-              <a:latin typeface="SHELMAN" panose="00000400000000000000" pitchFamily="2" charset="2"/>
-            </a:endParaRPr>
-          </a:p>
-        </p:txBody>
-      </p:sp>
     </p:spTree>
     <p:extLst>
       <p:ext uri="{BB962C8B-B14F-4D97-AF65-F5344CB8AC3E}">

</xml_diff>